<commit_message>
update rmd, shiny content and hpi data
</commit_message>
<xml_diff>
--- a/03_rmarkdown/03c_ppt.pptx
+++ b/03_rmarkdown/03c_ppt.pptx
@@ -17,6 +17,7 @@
     <p:sldId id="265" r:id="rId11"/>
     <p:sldId id="266" r:id="rId12"/>
     <p:sldId id="267" r:id="rId13"/>
+    <p:sldId id="268" r:id="rId14"/>
   </p:sldIdLst>
   <p:sldSz cx="12192000" cy="6858000"/>
   <p:notesSz cx="6858000" cy="9144000"/>
@@ -15944,6 +15945,104 @@
             </a:pPr>
             <a:r>
               <a:rPr/>
+              <a:t>HPI</a:t>
+            </a:r>
+            <a:r>
+              <a:rPr/>
+              <a:t> </a:t>
+            </a:r>
+            <a:r>
+              <a:rPr/>
+              <a:t>over</a:t>
+            </a:r>
+            <a:r>
+              <a:rPr/>
+              <a:t> </a:t>
+            </a:r>
+            <a:r>
+              <a:rPr/>
+              <a:t>time</a:t>
+            </a:r>
+          </a:p>
+        </p:txBody>
+      </p:sp>
+      <p:pic>
+        <p:nvPicPr>
+          <p:cNvPr descr="03c_ppt_files/figure-pptx/hpi-plot-1.png" id="0" name="Picture 1"/>
+          <p:cNvPicPr>
+            <a:picLocks noGrp="1" noChangeAspect="1"/>
+          </p:cNvPicPr>
+          <p:nvPr/>
+        </p:nvPicPr>
+        <p:blipFill>
+          <a:blip r:embed="rId2"/>
+          <a:stretch>
+            <a:fillRect/>
+          </a:stretch>
+        </p:blipFill>
+        <p:spPr bwMode="auto">
+          <a:xfrm>
+            <a:off x="5118100" y="914400"/>
+            <a:ext cx="6273800" cy="5016500"/>
+          </a:xfrm>
+          <a:prstGeom prst="rect">
+            <a:avLst/>
+          </a:prstGeom>
+          <a:noFill/>
+          <a:ln w="9525">
+            <a:noFill/>
+            <a:headEnd/>
+            <a:tailEnd/>
+          </a:ln>
+        </p:spPr>
+      </p:pic>
+    </p:spTree>
+  </p:cSld>
+</p:sld>
+</file>
+
+<file path=ppt/slides/slide11.xml><?xml version="1.0" encoding="utf-8"?>
+<p:sld xmlns:a="http://schemas.openxmlformats.org/drawingml/2006/main" xmlns:r="http://schemas.openxmlformats.org/officeDocument/2006/relationships" xmlns:p="http://schemas.openxmlformats.org/presentationml/2006/main">
+  <p:cSld>
+    <p:spTree>
+      <p:nvGrpSpPr>
+        <p:cNvPr id="1" name=""/>
+        <p:cNvGrpSpPr/>
+        <p:nvPr/>
+      </p:nvGrpSpPr>
+      <p:grpSpPr>
+        <a:xfrm>
+          <a:off x="0" y="0"/>
+          <a:ext cx="0" cy="0"/>
+          <a:chOff x="0" y="0"/>
+          <a:chExt cx="0" cy="0"/>
+        </a:xfrm>
+      </p:grpSpPr>
+      <p:sp>
+        <p:nvSpPr>
+          <p:cNvPr id="2" name="Title 1"/>
+          <p:cNvSpPr>
+            <a:spLocks noGrp="1"/>
+          </p:cNvSpPr>
+          <p:nvPr>
+            <p:ph type="title"/>
+          </p:nvPr>
+        </p:nvSpPr>
+        <p:spPr>
+          <a:xfrm>
+            <a:off x="888631" y="2349925"/>
+            <a:ext cx="3498979" cy="2456442"/>
+          </a:xfrm>
+        </p:spPr>
+        <p:txBody>
+          <a:bodyPr/>
+          <a:lstStyle/>
+          <a:p>
+            <a:pPr lvl="0" marL="0" indent="0">
+              <a:buNone/>
+            </a:pPr>
+            <a:r>
+              <a:rPr/>
               <a:t>Distributions</a:t>
             </a:r>
             <a:r>
@@ -16008,7 +16107,7 @@
 </p:sld>
 </file>
 
-<file path=ppt/slides/slide11.xml><?xml version="1.0" encoding="utf-8"?>
+<file path=ppt/slides/slide12.xml><?xml version="1.0" encoding="utf-8"?>
 <p:sld xmlns:a="http://schemas.openxmlformats.org/drawingml/2006/main" xmlns:r="http://schemas.openxmlformats.org/officeDocument/2006/relationships" xmlns:p="http://schemas.openxmlformats.org/presentationml/2006/main">
   <p:cSld>
     <p:spTree>
@@ -16093,7 +16192,7 @@
 </p:sld>
 </file>
 
-<file path=ppt/slides/slide12.xml><?xml version="1.0" encoding="utf-8"?>
+<file path=ppt/slides/slide13.xml><?xml version="1.0" encoding="utf-8"?>
 <p:sld xmlns:a="http://schemas.openxmlformats.org/drawingml/2006/main" xmlns:r="http://schemas.openxmlformats.org/officeDocument/2006/relationships" xmlns:p="http://schemas.openxmlformats.org/presentationml/2006/main">
   <p:cSld>
     <p:spTree>
@@ -16628,7 +16727,17 @@
             </a:r>
             <a:r>
               <a:rPr/>
-              <a:t>: whether to print any warnings or messages generated by our code</a:t>
+              <a:t>, </a:t>
+            </a:r>
+            <a:r>
+              <a:rPr sz="1800">
+                <a:latin typeface="Courier"/>
+              </a:rPr>
+              <a:t>error</a:t>
+            </a:r>
+            <a:r>
+              <a:rPr/>
+              <a:t>: whether to print any warnings, messages, or errors generated by our code</a:t>
             </a:r>
           </a:p>
           <a:p>
@@ -16903,105 +17012,6 @@
               <a:t>* Render text as code blocks with triple tick marks</a:t>
             </a:r>
           </a:p>
-          <a:p>
-            <a:pPr lvl="1"/>
-            <a:r>
-              <a:rPr/>
-              <a:t>Create section headings with </a:t>
-            </a:r>
-            <a:r>
-              <a:rPr sz="1800">
-                <a:latin typeface="Courier"/>
-              </a:rPr>
-              <a:t>#</a:t>
-            </a:r>
-            <a:r>
-              <a:rPr/>
-              <a:t> (and subheadings with </a:t>
-            </a:r>
-            <a:r>
-              <a:rPr sz="1800">
-                <a:latin typeface="Courier"/>
-              </a:rPr>
-              <a:t>##</a:t>
-            </a:r>
-            <a:r>
-              <a:rPr/>
-              <a:t>, </a:t>
-            </a:r>
-            <a:r>
-              <a:rPr sz="1800">
-                <a:latin typeface="Courier"/>
-              </a:rPr>
-              <a:t>###</a:t>
-            </a:r>
-            <a:r>
-              <a:rPr/>
-              <a:t>, </a:t>
-            </a:r>
-            <a:r>
-              <a:rPr sz="1800">
-                <a:latin typeface="Courier"/>
-              </a:rPr>
-              <a:t>####</a:t>
-            </a:r>
-            <a:r>
-              <a:rPr/>
-              <a:t>, …)</a:t>
-            </a:r>
-          </a:p>
-          <a:p>
-            <a:pPr lvl="1"/>
-            <a:r>
-              <a:rPr/>
-              <a:t>Create ordered lists with 1., 2., 3., … and unordered lists with </a:t>
-            </a:r>
-            <a:r>
-              <a:rPr sz="1800">
-                <a:latin typeface="Courier"/>
-              </a:rPr>
-              <a:t>*</a:t>
-            </a:r>
-            <a:r>
-              <a:rPr/>
-              <a:t>, </a:t>
-            </a:r>
-            <a:r>
-              <a:rPr sz="1800">
-                <a:latin typeface="Courier"/>
-              </a:rPr>
-              <a:t>-</a:t>
-            </a:r>
-            <a:r>
-              <a:rPr/>
-              <a:t>, or </a:t>
-            </a:r>
-            <a:r>
-              <a:rPr sz="1800">
-                <a:latin typeface="Courier"/>
-              </a:rPr>
-              <a:t>+</a:t>
-            </a:r>
-          </a:p>
-          <a:p>
-            <a:pPr lvl="1"/>
-            <a:r>
-              <a:rPr/>
-              <a:t>Create footnotes with </a:t>
-            </a:r>
-            <a:r>
-              <a:rPr sz="1800">
-                <a:latin typeface="Courier"/>
-              </a:rPr>
-              <a:t>^[]</a:t>
-            </a:r>
-            <a:r>
-              <a:rPr baseline="30000">
-                <a:hlinkClick r:id="rId3" action="ppaction://hlinksldjump"/>
-              </a:rPr>
-              <a:t>2</a:t>
-            </a:r>
-          </a:p>
         </p:txBody>
       </p:sp>
     </p:spTree>
@@ -17010,6 +17020,248 @@
 </file>
 
 <file path=ppt/slides/slide8.xml><?xml version="1.0" encoding="utf-8"?>
+<p:sld xmlns:a="http://schemas.openxmlformats.org/drawingml/2006/main" xmlns:r="http://schemas.openxmlformats.org/officeDocument/2006/relationships" xmlns:p="http://schemas.openxmlformats.org/presentationml/2006/main">
+  <p:cSld>
+    <p:spTree>
+      <p:nvGrpSpPr>
+        <p:cNvPr id="1" name=""/>
+        <p:cNvGrpSpPr/>
+        <p:nvPr/>
+      </p:nvGrpSpPr>
+      <p:grpSpPr>
+        <a:xfrm>
+          <a:off x="0" y="0"/>
+          <a:ext cx="0" cy="0"/>
+          <a:chOff x="0" y="0"/>
+          <a:chExt cx="0" cy="0"/>
+        </a:xfrm>
+      </p:grpSpPr>
+      <mc:AlternateContent xmlns:mc="http://schemas.openxmlformats.org/markup-compatibility/2006">
+        <mc:Choice xmlns:a14="http://schemas.microsoft.com/office/drawing/2010/main" Requires="a14">
+          <p:sp>
+            <p:nvSpPr>
+              <p:cNvPr id="3" name="Content Placeholder 2"/>
+              <p:cNvSpPr>
+                <a:spLocks noGrp="1"/>
+              </p:cNvSpPr>
+              <p:nvPr>
+                <p:ph idx="1"/>
+              </p:nvPr>
+            </p:nvSpPr>
+            <p:spPr/>
+            <p:txBody>
+              <a:bodyPr/>
+              <a:lstStyle/>
+              <a:p>
+                <a:pPr lvl="1"/>
+                <a:r>
+                  <a:rPr/>
+                  <a:t>Create section headings with </a:t>
+                </a:r>
+                <a:r>
+                  <a:rPr sz="1800">
+                    <a:latin typeface="Courier"/>
+                  </a:rPr>
+                  <a:t>#</a:t>
+                </a:r>
+                <a:r>
+                  <a:rPr/>
+                  <a:t> (and subheadings with </a:t>
+                </a:r>
+                <a:r>
+                  <a:rPr sz="1800">
+                    <a:latin typeface="Courier"/>
+                  </a:rPr>
+                  <a:t>##</a:t>
+                </a:r>
+                <a:r>
+                  <a:rPr/>
+                  <a:t>, </a:t>
+                </a:r>
+                <a:r>
+                  <a:rPr sz="1800">
+                    <a:latin typeface="Courier"/>
+                  </a:rPr>
+                  <a:t>###</a:t>
+                </a:r>
+                <a:r>
+                  <a:rPr/>
+                  <a:t>, </a:t>
+                </a:r>
+                <a:r>
+                  <a:rPr sz="1800">
+                    <a:latin typeface="Courier"/>
+                  </a:rPr>
+                  <a:t>####</a:t>
+                </a:r>
+                <a:r>
+                  <a:rPr/>
+                  <a:t>, …)</a:t>
+                </a:r>
+              </a:p>
+              <a:p>
+                <a:pPr lvl="1"/>
+                <a:r>
+                  <a:rPr/>
+                  <a:t>Create ordered lists with 1., 2., 3., … and unordered lists with </a:t>
+                </a:r>
+                <a:r>
+                  <a:rPr sz="1800">
+                    <a:latin typeface="Courier"/>
+                  </a:rPr>
+                  <a:t>*</a:t>
+                </a:r>
+                <a:r>
+                  <a:rPr/>
+                  <a:t>, </a:t>
+                </a:r>
+                <a:r>
+                  <a:rPr sz="1800">
+                    <a:latin typeface="Courier"/>
+                  </a:rPr>
+                  <a:t>-</a:t>
+                </a:r>
+                <a:r>
+                  <a:rPr/>
+                  <a:t>, or </a:t>
+                </a:r>
+                <a:r>
+                  <a:rPr sz="1800">
+                    <a:latin typeface="Courier"/>
+                  </a:rPr>
+                  <a:t>+</a:t>
+                </a:r>
+              </a:p>
+              <a:p>
+                <a:pPr lvl="1"/>
+                <a:r>
+                  <a:rPr/>
+                  <a:t>Create footnotes with </a:t>
+                </a:r>
+                <a:r>
+                  <a:rPr sz="1800">
+                    <a:latin typeface="Courier"/>
+                  </a:rPr>
+                  <a:t>^[]</a:t>
+                </a:r>
+                <a:r>
+                  <a:rPr baseline="30000">
+                    <a:hlinkClick r:id="rId2" action="ppaction://hlinksldjump"/>
+                  </a:rPr>
+                  <a:t>2</a:t>
+                </a:r>
+              </a:p>
+              <a:p>
+                <a:pPr lvl="1"/>
+                <a:r>
+                  <a:rPr/>
+                  <a:t>Create math equations with LaTeX syntax: </a:t>
+                </a:r>
+                <a14:m>
+                  <m:oMath xmlns:m="http://schemas.openxmlformats.org/officeDocument/2006/math">
+                    <m:r>
+                      <m:t>f</m:t>
+                    </m:r>
+                    <m:r>
+                      <m:t>(</m:t>
+                    </m:r>
+                    <m:r>
+                      <m:t>k</m:t>
+                    </m:r>
+                    <m:r>
+                      <m:t>)</m:t>
+                    </m:r>
+                    <m:r>
+                      <m:t>=</m:t>
+                    </m:r>
+                    <m:d>
+                      <m:dPr>
+                        <m:begChr m:val="("/>
+                        <m:endChr m:val=")"/>
+                        <m:grow/>
+                      </m:dPr>
+                      <m:e>
+                        <m:f>
+                          <m:fPr>
+                            <m:type m:val="noBar"/>
+                          </m:fPr>
+                          <m:num>
+                            <m:r>
+                              <m:t>n</m:t>
+                            </m:r>
+                          </m:num>
+                          <m:den>
+                            <m:r>
+                              <m:t>k</m:t>
+                            </m:r>
+                          </m:den>
+                        </m:f>
+                      </m:e>
+                    </m:d>
+                    <m:sSup>
+                      <m:e>
+                        <m:r>
+                          <m:t>p</m:t>
+                        </m:r>
+                      </m:e>
+                      <m:sup>
+                        <m:r>
+                          <m:t>k</m:t>
+                        </m:r>
+                      </m:sup>
+                    </m:sSup>
+                    <m:r>
+                      <m:t>(</m:t>
+                    </m:r>
+                    <m:r>
+                      <m:t>1</m:t>
+                    </m:r>
+                    <m:r>
+                      <m:t>−</m:t>
+                    </m:r>
+                    <m:r>
+                      <m:t>p</m:t>
+                    </m:r>
+                    <m:sSup>
+                      <m:e>
+                        <m:r>
+                          <m:t>)</m:t>
+                        </m:r>
+                      </m:e>
+                      <m:sup>
+                        <m:r>
+                          <m:t>n</m:t>
+                        </m:r>
+                        <m:r>
+                          <m:t>−</m:t>
+                        </m:r>
+                        <m:r>
+                          <m:t>k</m:t>
+                        </m:r>
+                      </m:sup>
+                    </m:sSup>
+                  </m:oMath>
+                </a14:m>
+              </a:p>
+              <a:p>
+                <a:pPr lvl="0" marL="0" indent="0">
+                  <a:buNone/>
+                </a:pPr>
+                <a:r>
+                  <a:rPr/>
+                  <a:t>We can even run code inline with single tick marks like this: The sum of 2 and 2 is 4.</a:t>
+                </a:r>
+              </a:p>
+            </p:txBody>
+          </p:sp>
+        </mc:Choice>
+      </mc:AlternateContent>
+    </p:spTree>
+  </p:cSld>
+</p:sld>
+</file>
+
+<file path=ppt/slides/slide9.xml><?xml version="1.0" encoding="utf-8"?>
 <p:sld xmlns:a="http://schemas.openxmlformats.org/drawingml/2006/main" xmlns:r="http://schemas.openxmlformats.org/officeDocument/2006/relationships" xmlns:p="http://schemas.openxmlformats.org/presentationml/2006/main">
   <p:cSld>
     <p:spTree>
@@ -17072,104 +17324,6 @@
           </a:p>
         </p:txBody>
       </p:sp>
-    </p:spTree>
-  </p:cSld>
-</p:sld>
-</file>
-
-<file path=ppt/slides/slide9.xml><?xml version="1.0" encoding="utf-8"?>
-<p:sld xmlns:a="http://schemas.openxmlformats.org/drawingml/2006/main" xmlns:r="http://schemas.openxmlformats.org/officeDocument/2006/relationships" xmlns:p="http://schemas.openxmlformats.org/presentationml/2006/main">
-  <p:cSld>
-    <p:spTree>
-      <p:nvGrpSpPr>
-        <p:cNvPr id="1" name=""/>
-        <p:cNvGrpSpPr/>
-        <p:nvPr/>
-      </p:nvGrpSpPr>
-      <p:grpSpPr>
-        <a:xfrm>
-          <a:off x="0" y="0"/>
-          <a:ext cx="0" cy="0"/>
-          <a:chOff x="0" y="0"/>
-          <a:chExt cx="0" cy="0"/>
-        </a:xfrm>
-      </p:grpSpPr>
-      <p:sp>
-        <p:nvSpPr>
-          <p:cNvPr id="2" name="Title 1"/>
-          <p:cNvSpPr>
-            <a:spLocks noGrp="1"/>
-          </p:cNvSpPr>
-          <p:nvPr>
-            <p:ph type="title"/>
-          </p:nvPr>
-        </p:nvSpPr>
-        <p:spPr>
-          <a:xfrm>
-            <a:off x="888631" y="2349925"/>
-            <a:ext cx="3498979" cy="2456442"/>
-          </a:xfrm>
-        </p:spPr>
-        <p:txBody>
-          <a:bodyPr/>
-          <a:lstStyle/>
-          <a:p>
-            <a:pPr lvl="0" marL="0" indent="0">
-              <a:buNone/>
-            </a:pPr>
-            <a:r>
-              <a:rPr/>
-              <a:t>HPI</a:t>
-            </a:r>
-            <a:r>
-              <a:rPr/>
-              <a:t> </a:t>
-            </a:r>
-            <a:r>
-              <a:rPr/>
-              <a:t>over</a:t>
-            </a:r>
-            <a:r>
-              <a:rPr/>
-              <a:t> </a:t>
-            </a:r>
-            <a:r>
-              <a:rPr/>
-              <a:t>time</a:t>
-            </a:r>
-          </a:p>
-        </p:txBody>
-      </p:sp>
-      <p:pic>
-        <p:nvPicPr>
-          <p:cNvPr descr="03c_ppt_files/figure-pptx/hpi-plot-1.png" id="0" name="Picture 1"/>
-          <p:cNvPicPr>
-            <a:picLocks noGrp="1" noChangeAspect="1"/>
-          </p:cNvPicPr>
-          <p:nvPr/>
-        </p:nvPicPr>
-        <p:blipFill>
-          <a:blip r:embed="rId2"/>
-          <a:stretch>
-            <a:fillRect/>
-          </a:stretch>
-        </p:blipFill>
-        <p:spPr bwMode="auto">
-          <a:xfrm>
-            <a:off x="5118100" y="914400"/>
-            <a:ext cx="6273800" cy="5016500"/>
-          </a:xfrm>
-          <a:prstGeom prst="rect">
-            <a:avLst/>
-          </a:prstGeom>
-          <a:noFill/>
-          <a:ln w="9525">
-            <a:noFill/>
-            <a:headEnd/>
-            <a:tailEnd/>
-          </a:ln>
-        </p:spPr>
-      </p:pic>
     </p:spTree>
   </p:cSld>
 </p:sld>

</xml_diff>

<commit_message>
update date to reflect current date
</commit_message>
<xml_diff>
--- a/03_rmarkdown/03c_ppt.pptx
+++ b/03_rmarkdown/03c_ppt.pptx
@@ -15893,7 +15893,23 @@
             </a:pPr>
             <a:r>
               <a:rPr/>
-              <a:t>9/15/2020</a:t>
+              <a:t>November</a:t>
+            </a:r>
+            <a:r>
+              <a:rPr/>
+              <a:t> </a:t>
+            </a:r>
+            <a:r>
+              <a:rPr/>
+              <a:t>11,</a:t>
+            </a:r>
+            <a:r>
+              <a:rPr/>
+              <a:t> </a:t>
+            </a:r>
+            <a:r>
+              <a:rPr/>
+              <a:t>2020</a:t>
             </a:r>
           </a:p>
         </p:txBody>

</xml_diff>